<commit_message>
uploading repo clean up and final updates to code and pptx file
</commit_message>
<xml_diff>
--- a/What drives parent’s decisions when choosing a name v3.pptx
+++ b/What drives parent’s decisions when choosing a name v3.pptx
@@ -21,12 +21,14 @@
     <p:sldId id="272" r:id="rId15"/>
     <p:sldId id="282" r:id="rId16"/>
     <p:sldId id="283" r:id="rId17"/>
-    <p:sldId id="277" r:id="rId18"/>
-    <p:sldId id="287" r:id="rId19"/>
-    <p:sldId id="288" r:id="rId20"/>
-    <p:sldId id="289" r:id="rId21"/>
-    <p:sldId id="263" r:id="rId22"/>
-    <p:sldId id="271" r:id="rId23"/>
+    <p:sldId id="291" r:id="rId18"/>
+    <p:sldId id="292" r:id="rId19"/>
+    <p:sldId id="277" r:id="rId20"/>
+    <p:sldId id="287" r:id="rId21"/>
+    <p:sldId id="288" r:id="rId22"/>
+    <p:sldId id="289" r:id="rId23"/>
+    <p:sldId id="263" r:id="rId24"/>
+    <p:sldId id="271" r:id="rId25"/>
   </p:sldIdLst>
   <p:sldSz cx="12192000" cy="6858000"/>
   <p:notesSz cx="6858000" cy="9144000"/>
@@ -314,7 +316,7 @@
           <a:p>
             <a:fld id="{CCDB3F03-7BAD-4B8F-91DC-EFAC7EDB9851}" type="datetimeFigureOut">
               <a:rPr lang="en-US" smtClean="0"/>
-              <a:t>9/12/2019</a:t>
+              <a:t>9/13/2019</a:t>
             </a:fld>
             <a:endParaRPr lang="en-US"/>
           </a:p>
@@ -524,7 +526,7 @@
           <a:p>
             <a:fld id="{CCDB3F03-7BAD-4B8F-91DC-EFAC7EDB9851}" type="datetimeFigureOut">
               <a:rPr lang="en-US" smtClean="0"/>
-              <a:t>9/12/2019</a:t>
+              <a:t>9/13/2019</a:t>
             </a:fld>
             <a:endParaRPr lang="en-US"/>
           </a:p>
@@ -744,7 +746,7 @@
           <a:p>
             <a:fld id="{CCDB3F03-7BAD-4B8F-91DC-EFAC7EDB9851}" type="datetimeFigureOut">
               <a:rPr lang="en-US" smtClean="0"/>
-              <a:t>9/12/2019</a:t>
+              <a:t>9/13/2019</a:t>
             </a:fld>
             <a:endParaRPr lang="en-US"/>
           </a:p>
@@ -954,7 +956,7 @@
           <a:p>
             <a:fld id="{CCDB3F03-7BAD-4B8F-91DC-EFAC7EDB9851}" type="datetimeFigureOut">
               <a:rPr lang="en-US" smtClean="0"/>
-              <a:t>9/12/2019</a:t>
+              <a:t>9/13/2019</a:t>
             </a:fld>
             <a:endParaRPr lang="en-US"/>
           </a:p>
@@ -1187,7 +1189,7 @@
           <a:p>
             <a:fld id="{CCDB3F03-7BAD-4B8F-91DC-EFAC7EDB9851}" type="datetimeFigureOut">
               <a:rPr lang="en-US" smtClean="0"/>
-              <a:t>9/12/2019</a:t>
+              <a:t>9/13/2019</a:t>
             </a:fld>
             <a:endParaRPr lang="en-US"/>
           </a:p>
@@ -1464,7 +1466,7 @@
           <a:p>
             <a:fld id="{CCDB3F03-7BAD-4B8F-91DC-EFAC7EDB9851}" type="datetimeFigureOut">
               <a:rPr lang="en-US" smtClean="0"/>
-              <a:t>9/12/2019</a:t>
+              <a:t>9/13/2019</a:t>
             </a:fld>
             <a:endParaRPr lang="en-US"/>
           </a:p>
@@ -1888,7 +1890,7 @@
           <a:p>
             <a:fld id="{CCDB3F03-7BAD-4B8F-91DC-EFAC7EDB9851}" type="datetimeFigureOut">
               <a:rPr lang="en-US" smtClean="0"/>
-              <a:t>9/12/2019</a:t>
+              <a:t>9/13/2019</a:t>
             </a:fld>
             <a:endParaRPr lang="en-US"/>
           </a:p>
@@ -2041,7 +2043,7 @@
           <a:p>
             <a:fld id="{CCDB3F03-7BAD-4B8F-91DC-EFAC7EDB9851}" type="datetimeFigureOut">
               <a:rPr lang="en-US" smtClean="0"/>
-              <a:t>9/12/2019</a:t>
+              <a:t>9/13/2019</a:t>
             </a:fld>
             <a:endParaRPr lang="en-US"/>
           </a:p>
@@ -2166,7 +2168,7 @@
           <a:p>
             <a:fld id="{CCDB3F03-7BAD-4B8F-91DC-EFAC7EDB9851}" type="datetimeFigureOut">
               <a:rPr lang="en-US" smtClean="0"/>
-              <a:t>9/12/2019</a:t>
+              <a:t>9/13/2019</a:t>
             </a:fld>
             <a:endParaRPr lang="en-US"/>
           </a:p>
@@ -2489,7 +2491,7 @@
           <a:p>
             <a:fld id="{CCDB3F03-7BAD-4B8F-91DC-EFAC7EDB9851}" type="datetimeFigureOut">
               <a:rPr lang="en-US" smtClean="0"/>
-              <a:t>9/12/2019</a:t>
+              <a:t>9/13/2019</a:t>
             </a:fld>
             <a:endParaRPr lang="en-US"/>
           </a:p>
@@ -2792,7 +2794,7 @@
           <a:p>
             <a:fld id="{CCDB3F03-7BAD-4B8F-91DC-EFAC7EDB9851}" type="datetimeFigureOut">
               <a:rPr lang="en-US" smtClean="0"/>
-              <a:t>9/12/2019</a:t>
+              <a:t>9/13/2019</a:t>
             </a:fld>
             <a:endParaRPr lang="en-US"/>
           </a:p>
@@ -3150,7 +3152,7 @@
           <a:p>
             <a:fld id="{CCDB3F03-7BAD-4B8F-91DC-EFAC7EDB9851}" type="datetimeFigureOut">
               <a:rPr lang="en-US" smtClean="0"/>
-              <a:t>9/12/2019</a:t>
+              <a:t>9/13/2019</a:t>
             </a:fld>
             <a:endParaRPr lang="en-US"/>
           </a:p>
@@ -4445,7 +4447,19 @@
           <a:p>
             <a:r>
               <a:rPr lang="en-US" dirty="0"/>
-              <a:t>Top Girl Names</a:t>
+              <a:t>Top </a:t>
+            </a:r>
+            <a:r>
+              <a:rPr lang="en-US" b="1" dirty="0">
+                <a:solidFill>
+                  <a:srgbClr val="FF0000"/>
+                </a:solidFill>
+              </a:rPr>
+              <a:t>Girl</a:t>
+            </a:r>
+            <a:r>
+              <a:rPr lang="en-US" dirty="0"/>
+              <a:t> Names</a:t>
             </a:r>
           </a:p>
         </p:txBody>
@@ -4570,7 +4584,19 @@
           <a:p>
             <a:r>
               <a:rPr lang="en-US" dirty="0"/>
-              <a:t>Top Boy Names</a:t>
+              <a:t>Top </a:t>
+            </a:r>
+            <a:r>
+              <a:rPr lang="en-US" b="1" dirty="0">
+                <a:solidFill>
+                  <a:srgbClr val="0070C0"/>
+                </a:solidFill>
+              </a:rPr>
+              <a:t>Boy</a:t>
+            </a:r>
+            <a:r>
+              <a:rPr lang="en-US" dirty="0"/>
+              <a:t> Names</a:t>
             </a:r>
           </a:p>
         </p:txBody>
@@ -4672,7 +4698,7 @@
           <p:cNvPr id="2" name="Title 1">
             <a:extLst>
               <a:ext uri="{FF2B5EF4-FFF2-40B4-BE49-F238E27FC236}">
-                <a16:creationId xmlns:a16="http://schemas.microsoft.com/office/drawing/2014/main" id="{786FE2E5-DF8D-4799-8DC3-B8DF8D21F157}"/>
+                <a16:creationId xmlns:a16="http://schemas.microsoft.com/office/drawing/2014/main" id="{AF559C2E-6A4E-4EF7-B495-8FCC9A99F60C}"/>
               </a:ext>
             </a:extLst>
           </p:cNvPr>
@@ -4685,96 +4711,70 @@
         </p:nvSpPr>
         <p:spPr>
           <a:xfrm>
-            <a:off x="4717774" y="274638"/>
-            <a:ext cx="6864626" cy="1143000"/>
+            <a:off x="302301" y="2121108"/>
+            <a:ext cx="4097312" cy="3155429"/>
           </a:xfrm>
         </p:spPr>
         <p:txBody>
           <a:bodyPr/>
           <a:lstStyle/>
           <a:p>
+            <a:pPr algn="r"/>
             <a:r>
               <a:rPr lang="en-US" dirty="0"/>
-              <a:t>Findings</a:t>
+              <a:t>Origin of top </a:t>
+            </a:r>
+            <a:r>
+              <a:rPr lang="en-US" b="1" dirty="0">
+                <a:solidFill>
+                  <a:srgbClr val="FF0000"/>
+                </a:solidFill>
+              </a:rPr>
+              <a:t>Girl</a:t>
+            </a:r>
+            <a:r>
+              <a:rPr lang="en-US" dirty="0"/>
+              <a:t> Names</a:t>
             </a:r>
           </a:p>
         </p:txBody>
       </p:sp>
       <p:pic>
         <p:nvPicPr>
-          <p:cNvPr id="4" name="Picture 3" descr="A screenshot of a cell phone&#10;&#10;Description automatically generated">
-            <a:extLst>
-              <a:ext uri="{FF2B5EF4-FFF2-40B4-BE49-F238E27FC236}">
-                <a16:creationId xmlns:a16="http://schemas.microsoft.com/office/drawing/2014/main" id="{5B787468-3D2B-4B7A-89D8-B9E72B54B787}"/>
+          <p:cNvPr id="6" name="Content Placeholder 3">
+            <a:extLst>
+              <a:ext uri="{FF2B5EF4-FFF2-40B4-BE49-F238E27FC236}">
+                <a16:creationId xmlns:a16="http://schemas.microsoft.com/office/drawing/2014/main" id="{07EC73A0-9ABD-4379-9258-DA659D743FCE}"/>
               </a:ext>
             </a:extLst>
           </p:cNvPr>
           <p:cNvPicPr>
-            <a:picLocks noChangeAspect="1"/>
+            <a:picLocks noGrp="1" noChangeAspect="1"/>
           </p:cNvPicPr>
-          <p:nvPr/>
+          <p:nvPr>
+            <p:ph idx="1"/>
+          </p:nvPr>
         </p:nvPicPr>
         <p:blipFill>
-          <a:blip r:embed="rId2">
-            <a:extLst>
-              <a:ext uri="{28A0092B-C50C-407E-A947-70E740481C1C}">
-                <a14:useLocalDpi xmlns:a14="http://schemas.microsoft.com/office/drawing/2010/main" val="0"/>
-              </a:ext>
-            </a:extLst>
-          </a:blip>
+          <a:blip r:embed="rId2"/>
           <a:stretch>
             <a:fillRect/>
           </a:stretch>
         </p:blipFill>
         <p:spPr>
           <a:xfrm>
-            <a:off x="6095999" y="2141352"/>
-            <a:ext cx="6092645" cy="3583909"/>
+            <a:off x="4934958" y="473257"/>
+            <a:ext cx="6839815" cy="5485333"/>
           </a:xfrm>
           <a:prstGeom prst="rect">
             <a:avLst/>
           </a:prstGeom>
-        </p:spPr>
-      </p:pic>
-      <p:pic>
-        <p:nvPicPr>
-          <p:cNvPr id="7" name="Content Placeholder 6">
-            <a:extLst>
-              <a:ext uri="{FF2B5EF4-FFF2-40B4-BE49-F238E27FC236}">
-                <a16:creationId xmlns:a16="http://schemas.microsoft.com/office/drawing/2014/main" id="{6F47425E-7D18-44B6-B23A-2014D4454738}"/>
-              </a:ext>
-            </a:extLst>
-          </p:cNvPr>
-          <p:cNvPicPr>
-            <a:picLocks noGrp="1" noChangeAspect="1"/>
-          </p:cNvPicPr>
-          <p:nvPr>
-            <p:ph idx="1"/>
-          </p:nvPr>
-        </p:nvPicPr>
-        <p:blipFill>
-          <a:blip r:embed="rId3">
-            <a:extLst>
-              <a:ext uri="{28A0092B-C50C-407E-A947-70E740481C1C}">
-                <a14:useLocalDpi xmlns:a14="http://schemas.microsoft.com/office/drawing/2010/main" val="0"/>
-              </a:ext>
-            </a:extLst>
-          </a:blip>
-          <a:stretch>
-            <a:fillRect/>
-          </a:stretch>
-        </p:blipFill>
-        <p:spPr>
-          <a:xfrm>
-            <a:off x="3355" y="2141351"/>
-            <a:ext cx="6092644" cy="3583909"/>
-          </a:xfrm>
         </p:spPr>
       </p:pic>
     </p:spTree>
     <p:extLst>
       <p:ext uri="{BB962C8B-B14F-4D97-AF65-F5344CB8AC3E}">
-        <p14:creationId xmlns:p14="http://schemas.microsoft.com/office/powerpoint/2010/main" val="2892243693"/>
+        <p14:creationId xmlns:p14="http://schemas.microsoft.com/office/powerpoint/2010/main" val="135639361"/>
       </p:ext>
     </p:extLst>
   </p:cSld>
@@ -4806,7 +4806,7 @@
           <p:cNvPr id="2" name="Title 1">
             <a:extLst>
               <a:ext uri="{FF2B5EF4-FFF2-40B4-BE49-F238E27FC236}">
-                <a16:creationId xmlns:a16="http://schemas.microsoft.com/office/drawing/2014/main" id="{786FE2E5-DF8D-4799-8DC3-B8DF8D21F157}"/>
+                <a16:creationId xmlns:a16="http://schemas.microsoft.com/office/drawing/2014/main" id="{2CF2A529-CDDC-4B1E-A14D-CB2A6AB29919}"/>
               </a:ext>
             </a:extLst>
           </p:cNvPr>
@@ -4819,27 +4819,40 @@
         </p:nvSpPr>
         <p:spPr>
           <a:xfrm>
-            <a:off x="4717774" y="274638"/>
-            <a:ext cx="6864626" cy="1143000"/>
+            <a:off x="324787" y="2128603"/>
+            <a:ext cx="4082321" cy="2825646"/>
           </a:xfrm>
         </p:spPr>
         <p:txBody>
           <a:bodyPr/>
           <a:lstStyle/>
           <a:p>
+            <a:pPr algn="r"/>
             <a:r>
               <a:rPr lang="en-US" dirty="0"/>
-              <a:t>Findings</a:t>
+              <a:t>Origin of top </a:t>
+            </a:r>
+            <a:r>
+              <a:rPr lang="en-US" b="1" dirty="0">
+                <a:solidFill>
+                  <a:srgbClr val="0070C0"/>
+                </a:solidFill>
+              </a:rPr>
+              <a:t>Boy</a:t>
+            </a:r>
+            <a:r>
+              <a:rPr lang="en-US" dirty="0"/>
+              <a:t> Names</a:t>
             </a:r>
           </a:p>
         </p:txBody>
       </p:sp>
       <p:pic>
         <p:nvPicPr>
-          <p:cNvPr id="5" name="Content Placeholder 4" descr="A screenshot of a cell phone&#10;&#10;Description automatically generated">
-            <a:extLst>
-              <a:ext uri="{FF2B5EF4-FFF2-40B4-BE49-F238E27FC236}">
-                <a16:creationId xmlns:a16="http://schemas.microsoft.com/office/drawing/2014/main" id="{C1941D35-3653-445A-9AA9-5BD4E6D1CD48}"/>
+          <p:cNvPr id="4" name="Content Placeholder 3">
+            <a:extLst>
+              <a:ext uri="{FF2B5EF4-FFF2-40B4-BE49-F238E27FC236}">
+                <a16:creationId xmlns:a16="http://schemas.microsoft.com/office/drawing/2014/main" id="{1021FA30-F2AE-4990-8A50-89C89782C3BA}"/>
               </a:ext>
             </a:extLst>
           </p:cNvPr>
@@ -4851,54 +4864,15 @@
           </p:nvPr>
         </p:nvPicPr>
         <p:blipFill>
-          <a:blip r:embed="rId2">
-            <a:extLst>
-              <a:ext uri="{28A0092B-C50C-407E-A947-70E740481C1C}">
-                <a14:useLocalDpi xmlns:a14="http://schemas.microsoft.com/office/drawing/2010/main" val="0"/>
-              </a:ext>
-            </a:extLst>
-          </a:blip>
+          <a:blip r:embed="rId2"/>
           <a:stretch>
             <a:fillRect/>
           </a:stretch>
         </p:blipFill>
         <p:spPr>
           <a:xfrm>
-            <a:off x="0" y="2078899"/>
-            <a:ext cx="6096000" cy="3585883"/>
-          </a:xfrm>
-        </p:spPr>
-      </p:pic>
-      <p:pic>
-        <p:nvPicPr>
-          <p:cNvPr id="9" name="Picture 8">
-            <a:extLst>
-              <a:ext uri="{FF2B5EF4-FFF2-40B4-BE49-F238E27FC236}">
-                <a16:creationId xmlns:a16="http://schemas.microsoft.com/office/drawing/2014/main" id="{E84BC522-12E4-42B5-B823-A60DDAA0BD26}"/>
-              </a:ext>
-            </a:extLst>
-          </p:cNvPr>
-          <p:cNvPicPr>
-            <a:picLocks noChangeAspect="1"/>
-          </p:cNvPicPr>
-          <p:nvPr/>
-        </p:nvPicPr>
-        <p:blipFill>
-          <a:blip r:embed="rId3">
-            <a:extLst>
-              <a:ext uri="{28A0092B-C50C-407E-A947-70E740481C1C}">
-                <a14:useLocalDpi xmlns:a14="http://schemas.microsoft.com/office/drawing/2010/main" val="0"/>
-              </a:ext>
-            </a:extLst>
-          </a:blip>
-          <a:stretch>
-            <a:fillRect/>
-          </a:stretch>
-        </p:blipFill>
-        <p:spPr>
-          <a:xfrm>
-            <a:off x="6096000" y="2078899"/>
-            <a:ext cx="6096000" cy="3585882"/>
+            <a:off x="4939261" y="487180"/>
+            <a:ext cx="6715592" cy="5493361"/>
           </a:xfrm>
           <a:prstGeom prst="rect">
             <a:avLst/>
@@ -4908,7 +4882,7 @@
     </p:spTree>
     <p:extLst>
       <p:ext uri="{BB962C8B-B14F-4D97-AF65-F5344CB8AC3E}">
-        <p14:creationId xmlns:p14="http://schemas.microsoft.com/office/powerpoint/2010/main" val="643965291"/>
+        <p14:creationId xmlns:p14="http://schemas.microsoft.com/office/powerpoint/2010/main" val="2404407489"/>
       </p:ext>
     </p:extLst>
   </p:cSld>
@@ -4970,19 +4944,17 @@
       </p:sp>
       <p:pic>
         <p:nvPicPr>
-          <p:cNvPr id="6" name="Content Placeholder 5" descr="A screenshot of a cell phone&#10;&#10;Description automatically generated">
-            <a:extLst>
-              <a:ext uri="{FF2B5EF4-FFF2-40B4-BE49-F238E27FC236}">
-                <a16:creationId xmlns:a16="http://schemas.microsoft.com/office/drawing/2014/main" id="{7CFD9341-EEE9-456C-AA42-5359361504A9}"/>
+          <p:cNvPr id="4" name="Picture 3" descr="A screenshot of a cell phone&#10;&#10;Description automatically generated">
+            <a:extLst>
+              <a:ext uri="{FF2B5EF4-FFF2-40B4-BE49-F238E27FC236}">
+                <a16:creationId xmlns:a16="http://schemas.microsoft.com/office/drawing/2014/main" id="{5B787468-3D2B-4B7A-89D8-B9E72B54B787}"/>
               </a:ext>
             </a:extLst>
           </p:cNvPr>
           <p:cNvPicPr>
-            <a:picLocks noGrp="1" noChangeAspect="1"/>
+            <a:picLocks noChangeAspect="1"/>
           </p:cNvPicPr>
-          <p:nvPr>
-            <p:ph idx="1"/>
-          </p:nvPr>
+          <p:nvPr/>
         </p:nvPicPr>
         <p:blipFill>
           <a:blip r:embed="rId2">
@@ -4998,24 +4970,29 @@
         </p:blipFill>
         <p:spPr>
           <a:xfrm>
-            <a:off x="0" y="2141687"/>
-            <a:ext cx="6096000" cy="3585883"/>
-          </a:xfrm>
+            <a:off x="6095999" y="2141352"/>
+            <a:ext cx="6092645" cy="3583909"/>
+          </a:xfrm>
+          <a:prstGeom prst="rect">
+            <a:avLst/>
+          </a:prstGeom>
         </p:spPr>
       </p:pic>
       <p:pic>
         <p:nvPicPr>
-          <p:cNvPr id="9" name="Picture 8" descr="A close up of a logo&#10;&#10;Description automatically generated">
-            <a:extLst>
-              <a:ext uri="{FF2B5EF4-FFF2-40B4-BE49-F238E27FC236}">
-                <a16:creationId xmlns:a16="http://schemas.microsoft.com/office/drawing/2014/main" id="{6CD31C7E-3307-48C7-A90E-1E53359E82BE}"/>
+          <p:cNvPr id="7" name="Content Placeholder 6">
+            <a:extLst>
+              <a:ext uri="{FF2B5EF4-FFF2-40B4-BE49-F238E27FC236}">
+                <a16:creationId xmlns:a16="http://schemas.microsoft.com/office/drawing/2014/main" id="{6F47425E-7D18-44B6-B23A-2014D4454738}"/>
               </a:ext>
             </a:extLst>
           </p:cNvPr>
           <p:cNvPicPr>
-            <a:picLocks noChangeAspect="1"/>
+            <a:picLocks noGrp="1" noChangeAspect="1"/>
           </p:cNvPicPr>
-          <p:nvPr/>
+          <p:nvPr>
+            <p:ph idx="1"/>
+          </p:nvPr>
         </p:nvPicPr>
         <p:blipFill>
           <a:blip r:embed="rId3">
@@ -5031,18 +5008,15 @@
         </p:blipFill>
         <p:spPr>
           <a:xfrm>
-            <a:off x="6096000" y="2141687"/>
-            <a:ext cx="6096000" cy="3585882"/>
-          </a:xfrm>
-          <a:prstGeom prst="rect">
-            <a:avLst/>
-          </a:prstGeom>
+            <a:off x="3355" y="2141351"/>
+            <a:ext cx="6092644" cy="3583909"/>
+          </a:xfrm>
         </p:spPr>
       </p:pic>
     </p:spTree>
     <p:extLst>
       <p:ext uri="{BB962C8B-B14F-4D97-AF65-F5344CB8AC3E}">
-        <p14:creationId xmlns:p14="http://schemas.microsoft.com/office/powerpoint/2010/main" val="1380741199"/>
+        <p14:creationId xmlns:p14="http://schemas.microsoft.com/office/powerpoint/2010/main" val="2892243693"/>
       </p:ext>
     </p:extLst>
   </p:cSld>
@@ -5219,7 +5193,7 @@
         </p:nvSpPr>
         <p:spPr>
           <a:xfrm>
-            <a:off x="4717774" y="261386"/>
+            <a:off x="4717774" y="274638"/>
             <a:ext cx="6864626" cy="1143000"/>
           </a:xfrm>
         </p:spPr>
@@ -5236,10 +5210,45 @@
       </p:sp>
       <p:pic>
         <p:nvPicPr>
-          <p:cNvPr id="4" name="Picture 3" descr="A screenshot of a cell phone&#10;&#10;Description automatically generated">
-            <a:extLst>
-              <a:ext uri="{FF2B5EF4-FFF2-40B4-BE49-F238E27FC236}">
-                <a16:creationId xmlns:a16="http://schemas.microsoft.com/office/drawing/2014/main" id="{0C95B3B7-6879-4B86-A8C6-7E13CFF8149F}"/>
+          <p:cNvPr id="5" name="Content Placeholder 4" descr="A screenshot of a cell phone&#10;&#10;Description automatically generated">
+            <a:extLst>
+              <a:ext uri="{FF2B5EF4-FFF2-40B4-BE49-F238E27FC236}">
+                <a16:creationId xmlns:a16="http://schemas.microsoft.com/office/drawing/2014/main" id="{C1941D35-3653-445A-9AA9-5BD4E6D1CD48}"/>
+              </a:ext>
+            </a:extLst>
+          </p:cNvPr>
+          <p:cNvPicPr>
+            <a:picLocks noGrp="1" noChangeAspect="1"/>
+          </p:cNvPicPr>
+          <p:nvPr>
+            <p:ph idx="1"/>
+          </p:nvPr>
+        </p:nvPicPr>
+        <p:blipFill>
+          <a:blip r:embed="rId2">
+            <a:extLst>
+              <a:ext uri="{28A0092B-C50C-407E-A947-70E740481C1C}">
+                <a14:useLocalDpi xmlns:a14="http://schemas.microsoft.com/office/drawing/2010/main" val="0"/>
+              </a:ext>
+            </a:extLst>
+          </a:blip>
+          <a:stretch>
+            <a:fillRect/>
+          </a:stretch>
+        </p:blipFill>
+        <p:spPr>
+          <a:xfrm>
+            <a:off x="0" y="2078899"/>
+            <a:ext cx="6096000" cy="3585883"/>
+          </a:xfrm>
+        </p:spPr>
+      </p:pic>
+      <p:pic>
+        <p:nvPicPr>
+          <p:cNvPr id="9" name="Picture 8">
+            <a:extLst>
+              <a:ext uri="{FF2B5EF4-FFF2-40B4-BE49-F238E27FC236}">
+                <a16:creationId xmlns:a16="http://schemas.microsoft.com/office/drawing/2014/main" id="{E84BC522-12E4-42B5-B823-A60DDAA0BD26}"/>
               </a:ext>
             </a:extLst>
           </p:cNvPr>
@@ -5249,7 +5258,7 @@
           <p:nvPr/>
         </p:nvPicPr>
         <p:blipFill>
-          <a:blip r:embed="rId2">
+          <a:blip r:embed="rId3">
             <a:extLst>
               <a:ext uri="{28A0092B-C50C-407E-A947-70E740481C1C}">
                 <a14:useLocalDpi xmlns:a14="http://schemas.microsoft.com/office/drawing/2010/main" val="0"/>
@@ -5262,53 +5271,18 @@
         </p:blipFill>
         <p:spPr>
           <a:xfrm>
-            <a:off x="0" y="2193235"/>
-            <a:ext cx="6095998" cy="3585881"/>
+            <a:off x="6096000" y="2078899"/>
+            <a:ext cx="6096000" cy="3585882"/>
           </a:xfrm>
           <a:prstGeom prst="rect">
             <a:avLst/>
           </a:prstGeom>
-        </p:spPr>
-      </p:pic>
-      <p:pic>
-        <p:nvPicPr>
-          <p:cNvPr id="9" name="Content Placeholder 8" descr="A screenshot of a social media post&#10;&#10;Description automatically generated">
-            <a:extLst>
-              <a:ext uri="{FF2B5EF4-FFF2-40B4-BE49-F238E27FC236}">
-                <a16:creationId xmlns:a16="http://schemas.microsoft.com/office/drawing/2014/main" id="{862D7BCB-8C51-4725-8700-483673791286}"/>
-              </a:ext>
-            </a:extLst>
-          </p:cNvPr>
-          <p:cNvPicPr>
-            <a:picLocks noGrp="1" noChangeAspect="1"/>
-          </p:cNvPicPr>
-          <p:nvPr>
-            <p:ph idx="1"/>
-          </p:nvPr>
-        </p:nvPicPr>
-        <p:blipFill>
-          <a:blip r:embed="rId3">
-            <a:extLst>
-              <a:ext uri="{28A0092B-C50C-407E-A947-70E740481C1C}">
-                <a14:useLocalDpi xmlns:a14="http://schemas.microsoft.com/office/drawing/2010/main" val="0"/>
-              </a:ext>
-            </a:extLst>
-          </a:blip>
-          <a:stretch>
-            <a:fillRect/>
-          </a:stretch>
-        </p:blipFill>
-        <p:spPr>
-          <a:xfrm>
-            <a:off x="6095997" y="2193235"/>
-            <a:ext cx="6095997" cy="3585881"/>
-          </a:xfrm>
         </p:spPr>
       </p:pic>
     </p:spTree>
     <p:extLst>
       <p:ext uri="{BB962C8B-B14F-4D97-AF65-F5344CB8AC3E}">
-        <p14:creationId xmlns:p14="http://schemas.microsoft.com/office/powerpoint/2010/main" val="1107283967"/>
+        <p14:creationId xmlns:p14="http://schemas.microsoft.com/office/powerpoint/2010/main" val="643965291"/>
       </p:ext>
     </p:extLst>
   </p:cSld>
@@ -5340,6 +5314,274 @@
           <p:cNvPr id="2" name="Title 1">
             <a:extLst>
               <a:ext uri="{FF2B5EF4-FFF2-40B4-BE49-F238E27FC236}">
+                <a16:creationId xmlns:a16="http://schemas.microsoft.com/office/drawing/2014/main" id="{786FE2E5-DF8D-4799-8DC3-B8DF8D21F157}"/>
+              </a:ext>
+            </a:extLst>
+          </p:cNvPr>
+          <p:cNvSpPr>
+            <a:spLocks noGrp="1"/>
+          </p:cNvSpPr>
+          <p:nvPr>
+            <p:ph type="title"/>
+          </p:nvPr>
+        </p:nvSpPr>
+        <p:spPr>
+          <a:xfrm>
+            <a:off x="4717774" y="274638"/>
+            <a:ext cx="6864626" cy="1143000"/>
+          </a:xfrm>
+        </p:spPr>
+        <p:txBody>
+          <a:bodyPr/>
+          <a:lstStyle/>
+          <a:p>
+            <a:r>
+              <a:rPr lang="en-US" dirty="0"/>
+              <a:t>Findings</a:t>
+            </a:r>
+          </a:p>
+        </p:txBody>
+      </p:sp>
+      <p:pic>
+        <p:nvPicPr>
+          <p:cNvPr id="6" name="Content Placeholder 5" descr="A screenshot of a cell phone&#10;&#10;Description automatically generated">
+            <a:extLst>
+              <a:ext uri="{FF2B5EF4-FFF2-40B4-BE49-F238E27FC236}">
+                <a16:creationId xmlns:a16="http://schemas.microsoft.com/office/drawing/2014/main" id="{7CFD9341-EEE9-456C-AA42-5359361504A9}"/>
+              </a:ext>
+            </a:extLst>
+          </p:cNvPr>
+          <p:cNvPicPr>
+            <a:picLocks noGrp="1" noChangeAspect="1"/>
+          </p:cNvPicPr>
+          <p:nvPr>
+            <p:ph idx="1"/>
+          </p:nvPr>
+        </p:nvPicPr>
+        <p:blipFill>
+          <a:blip r:embed="rId2">
+            <a:extLst>
+              <a:ext uri="{28A0092B-C50C-407E-A947-70E740481C1C}">
+                <a14:useLocalDpi xmlns:a14="http://schemas.microsoft.com/office/drawing/2010/main" val="0"/>
+              </a:ext>
+            </a:extLst>
+          </a:blip>
+          <a:stretch>
+            <a:fillRect/>
+          </a:stretch>
+        </p:blipFill>
+        <p:spPr>
+          <a:xfrm>
+            <a:off x="0" y="2141687"/>
+            <a:ext cx="6096000" cy="3585883"/>
+          </a:xfrm>
+        </p:spPr>
+      </p:pic>
+      <p:pic>
+        <p:nvPicPr>
+          <p:cNvPr id="9" name="Picture 8" descr="A close up of a logo&#10;&#10;Description automatically generated">
+            <a:extLst>
+              <a:ext uri="{FF2B5EF4-FFF2-40B4-BE49-F238E27FC236}">
+                <a16:creationId xmlns:a16="http://schemas.microsoft.com/office/drawing/2014/main" id="{6CD31C7E-3307-48C7-A90E-1E53359E82BE}"/>
+              </a:ext>
+            </a:extLst>
+          </p:cNvPr>
+          <p:cNvPicPr>
+            <a:picLocks noChangeAspect="1"/>
+          </p:cNvPicPr>
+          <p:nvPr/>
+        </p:nvPicPr>
+        <p:blipFill>
+          <a:blip r:embed="rId3">
+            <a:extLst>
+              <a:ext uri="{28A0092B-C50C-407E-A947-70E740481C1C}">
+                <a14:useLocalDpi xmlns:a14="http://schemas.microsoft.com/office/drawing/2010/main" val="0"/>
+              </a:ext>
+            </a:extLst>
+          </a:blip>
+          <a:stretch>
+            <a:fillRect/>
+          </a:stretch>
+        </p:blipFill>
+        <p:spPr>
+          <a:xfrm>
+            <a:off x="6096000" y="2141687"/>
+            <a:ext cx="6096000" cy="3585882"/>
+          </a:xfrm>
+          <a:prstGeom prst="rect">
+            <a:avLst/>
+          </a:prstGeom>
+        </p:spPr>
+      </p:pic>
+    </p:spTree>
+    <p:extLst>
+      <p:ext uri="{BB962C8B-B14F-4D97-AF65-F5344CB8AC3E}">
+        <p14:creationId xmlns:p14="http://schemas.microsoft.com/office/powerpoint/2010/main" val="1380741199"/>
+      </p:ext>
+    </p:extLst>
+  </p:cSld>
+  <p:clrMapOvr>
+    <a:masterClrMapping/>
+  </p:clrMapOvr>
+</p:sld>
+</file>
+
+<file path=ppt/slides/slide22.xml><?xml version="1.0" encoding="utf-8"?>
+<p:sld xmlns:a="http://schemas.openxmlformats.org/drawingml/2006/main" xmlns:r="http://schemas.openxmlformats.org/officeDocument/2006/relationships" xmlns:p="http://schemas.openxmlformats.org/presentationml/2006/main">
+  <p:cSld>
+    <p:spTree>
+      <p:nvGrpSpPr>
+        <p:cNvPr id="1" name=""/>
+        <p:cNvGrpSpPr/>
+        <p:nvPr/>
+      </p:nvGrpSpPr>
+      <p:grpSpPr>
+        <a:xfrm>
+          <a:off x="0" y="0"/>
+          <a:ext cx="0" cy="0"/>
+          <a:chOff x="0" y="0"/>
+          <a:chExt cx="0" cy="0"/>
+        </a:xfrm>
+      </p:grpSpPr>
+      <p:sp>
+        <p:nvSpPr>
+          <p:cNvPr id="2" name="Title 1">
+            <a:extLst>
+              <a:ext uri="{FF2B5EF4-FFF2-40B4-BE49-F238E27FC236}">
+                <a16:creationId xmlns:a16="http://schemas.microsoft.com/office/drawing/2014/main" id="{786FE2E5-DF8D-4799-8DC3-B8DF8D21F157}"/>
+              </a:ext>
+            </a:extLst>
+          </p:cNvPr>
+          <p:cNvSpPr>
+            <a:spLocks noGrp="1"/>
+          </p:cNvSpPr>
+          <p:nvPr>
+            <p:ph type="title"/>
+          </p:nvPr>
+        </p:nvSpPr>
+        <p:spPr>
+          <a:xfrm>
+            <a:off x="4717774" y="261386"/>
+            <a:ext cx="6864626" cy="1143000"/>
+          </a:xfrm>
+        </p:spPr>
+        <p:txBody>
+          <a:bodyPr/>
+          <a:lstStyle/>
+          <a:p>
+            <a:r>
+              <a:rPr lang="en-US" dirty="0"/>
+              <a:t>Findings</a:t>
+            </a:r>
+          </a:p>
+        </p:txBody>
+      </p:sp>
+      <p:pic>
+        <p:nvPicPr>
+          <p:cNvPr id="4" name="Picture 3" descr="A screenshot of a cell phone&#10;&#10;Description automatically generated">
+            <a:extLst>
+              <a:ext uri="{FF2B5EF4-FFF2-40B4-BE49-F238E27FC236}">
+                <a16:creationId xmlns:a16="http://schemas.microsoft.com/office/drawing/2014/main" id="{0C95B3B7-6879-4B86-A8C6-7E13CFF8149F}"/>
+              </a:ext>
+            </a:extLst>
+          </p:cNvPr>
+          <p:cNvPicPr>
+            <a:picLocks noChangeAspect="1"/>
+          </p:cNvPicPr>
+          <p:nvPr/>
+        </p:nvPicPr>
+        <p:blipFill>
+          <a:blip r:embed="rId2">
+            <a:extLst>
+              <a:ext uri="{28A0092B-C50C-407E-A947-70E740481C1C}">
+                <a14:useLocalDpi xmlns:a14="http://schemas.microsoft.com/office/drawing/2010/main" val="0"/>
+              </a:ext>
+            </a:extLst>
+          </a:blip>
+          <a:stretch>
+            <a:fillRect/>
+          </a:stretch>
+        </p:blipFill>
+        <p:spPr>
+          <a:xfrm>
+            <a:off x="0" y="2193235"/>
+            <a:ext cx="6095998" cy="3585881"/>
+          </a:xfrm>
+          <a:prstGeom prst="rect">
+            <a:avLst/>
+          </a:prstGeom>
+        </p:spPr>
+      </p:pic>
+      <p:pic>
+        <p:nvPicPr>
+          <p:cNvPr id="9" name="Content Placeholder 8" descr="A screenshot of a social media post&#10;&#10;Description automatically generated">
+            <a:extLst>
+              <a:ext uri="{FF2B5EF4-FFF2-40B4-BE49-F238E27FC236}">
+                <a16:creationId xmlns:a16="http://schemas.microsoft.com/office/drawing/2014/main" id="{862D7BCB-8C51-4725-8700-483673791286}"/>
+              </a:ext>
+            </a:extLst>
+          </p:cNvPr>
+          <p:cNvPicPr>
+            <a:picLocks noGrp="1" noChangeAspect="1"/>
+          </p:cNvPicPr>
+          <p:nvPr>
+            <p:ph idx="1"/>
+          </p:nvPr>
+        </p:nvPicPr>
+        <p:blipFill>
+          <a:blip r:embed="rId3">
+            <a:extLst>
+              <a:ext uri="{28A0092B-C50C-407E-A947-70E740481C1C}">
+                <a14:useLocalDpi xmlns:a14="http://schemas.microsoft.com/office/drawing/2010/main" val="0"/>
+              </a:ext>
+            </a:extLst>
+          </a:blip>
+          <a:stretch>
+            <a:fillRect/>
+          </a:stretch>
+        </p:blipFill>
+        <p:spPr>
+          <a:xfrm>
+            <a:off x="6095997" y="2193235"/>
+            <a:ext cx="6095997" cy="3585881"/>
+          </a:xfrm>
+        </p:spPr>
+      </p:pic>
+    </p:spTree>
+    <p:extLst>
+      <p:ext uri="{BB962C8B-B14F-4D97-AF65-F5344CB8AC3E}">
+        <p14:creationId xmlns:p14="http://schemas.microsoft.com/office/powerpoint/2010/main" val="1107283967"/>
+      </p:ext>
+    </p:extLst>
+  </p:cSld>
+  <p:clrMapOvr>
+    <a:masterClrMapping/>
+  </p:clrMapOvr>
+</p:sld>
+</file>
+
+<file path=ppt/slides/slide23.xml><?xml version="1.0" encoding="utf-8"?>
+<p:sld xmlns:a="http://schemas.openxmlformats.org/drawingml/2006/main" xmlns:r="http://schemas.openxmlformats.org/officeDocument/2006/relationships" xmlns:p="http://schemas.openxmlformats.org/presentationml/2006/main">
+  <p:cSld>
+    <p:spTree>
+      <p:nvGrpSpPr>
+        <p:cNvPr id="1" name=""/>
+        <p:cNvGrpSpPr/>
+        <p:nvPr/>
+      </p:nvGrpSpPr>
+      <p:grpSpPr>
+        <a:xfrm>
+          <a:off x="0" y="0"/>
+          <a:ext cx="0" cy="0"/>
+          <a:chOff x="0" y="0"/>
+          <a:chExt cx="0" cy="0"/>
+        </a:xfrm>
+      </p:grpSpPr>
+      <p:sp>
+        <p:nvSpPr>
+          <p:cNvPr id="2" name="Title 1">
+            <a:extLst>
+              <a:ext uri="{FF2B5EF4-FFF2-40B4-BE49-F238E27FC236}">
                 <a16:creationId xmlns:a16="http://schemas.microsoft.com/office/drawing/2014/main" id="{FC752C68-903E-4B1B-B54E-B264F6F79270}"/>
               </a:ext>
             </a:extLst>
@@ -5450,7 +5692,7 @@
 </p:sld>
 </file>
 
-<file path=ppt/slides/slide22.xml><?xml version="1.0" encoding="utf-8"?>
+<file path=ppt/slides/slide24.xml><?xml version="1.0" encoding="utf-8"?>
 <p:sld xmlns:a="http://schemas.openxmlformats.org/drawingml/2006/main" xmlns:r="http://schemas.openxmlformats.org/officeDocument/2006/relationships" xmlns:p="http://schemas.openxmlformats.org/presentationml/2006/main">
   <p:cSld>
     <p:spTree>
@@ -6330,6 +6572,12 @@
               <a:rPr lang="en-US" sz="2000" dirty="0"/>
               <a:t>Females have more diverse names compared to males</a:t>
             </a:r>
+          </a:p>
+          <a:p>
+            <a:pPr marL="457200" lvl="1" indent="0">
+              <a:buNone/>
+            </a:pPr>
+            <a:endParaRPr lang="en-US" sz="2000" dirty="0"/>
           </a:p>
         </p:txBody>
       </p:sp>

</xml_diff>